<commit_message>
Update "Govern" slide in presentation
</commit_message>
<xml_diff>
--- a/NIST.SP1300_ja_ver.happon.pptx
+++ b/NIST.SP1300_ja_ver.happon.pptx
@@ -13,6 +13,7 @@
     <p:sldId id="266" r:id="rId7"/>
     <p:sldId id="267" r:id="rId8"/>
     <p:sldId id="268" r:id="rId9"/>
+    <p:sldId id="269" r:id="rId10"/>
   </p:sldIdLst>
   <p:sldSz cx="12192000" cy="6858000"/>
   <p:notesSz cx="6858000" cy="9144000"/>
@@ -266,7 +267,7 @@
           <a:p>
             <a:fld id="{CB066C04-F0DD-4D0D-8700-364E6D806A2A}" type="datetimeFigureOut">
               <a:rPr kumimoji="1" lang="ja-JP" altLang="en-US" smtClean="0"/>
-              <a:t>2025/5/11</a:t>
+              <a:t>2025/5/13</a:t>
             </a:fld>
             <a:endParaRPr kumimoji="1" lang="ja-JP" altLang="en-US"/>
           </a:p>
@@ -496,7 +497,7 @@
           <a:p>
             <a:fld id="{CB066C04-F0DD-4D0D-8700-364E6D806A2A}" type="datetimeFigureOut">
               <a:rPr kumimoji="1" lang="ja-JP" altLang="en-US" smtClean="0"/>
-              <a:t>2025/5/11</a:t>
+              <a:t>2025/5/13</a:t>
             </a:fld>
             <a:endParaRPr kumimoji="1" lang="ja-JP" altLang="en-US"/>
           </a:p>
@@ -736,7 +737,7 @@
           <a:p>
             <a:fld id="{CB066C04-F0DD-4D0D-8700-364E6D806A2A}" type="datetimeFigureOut">
               <a:rPr kumimoji="1" lang="ja-JP" altLang="en-US" smtClean="0"/>
-              <a:t>2025/5/11</a:t>
+              <a:t>2025/5/13</a:t>
             </a:fld>
             <a:endParaRPr kumimoji="1" lang="ja-JP" altLang="en-US"/>
           </a:p>
@@ -966,7 +967,7 @@
           <a:p>
             <a:fld id="{CB066C04-F0DD-4D0D-8700-364E6D806A2A}" type="datetimeFigureOut">
               <a:rPr kumimoji="1" lang="ja-JP" altLang="en-US" smtClean="0"/>
-              <a:t>2025/5/11</a:t>
+              <a:t>2025/5/13</a:t>
             </a:fld>
             <a:endParaRPr kumimoji="1" lang="ja-JP" altLang="en-US"/>
           </a:p>
@@ -1241,7 +1242,7 @@
           <a:p>
             <a:fld id="{CB066C04-F0DD-4D0D-8700-364E6D806A2A}" type="datetimeFigureOut">
               <a:rPr kumimoji="1" lang="ja-JP" altLang="en-US" smtClean="0"/>
-              <a:t>2025/5/11</a:t>
+              <a:t>2025/5/13</a:t>
             </a:fld>
             <a:endParaRPr kumimoji="1" lang="ja-JP" altLang="en-US"/>
           </a:p>
@@ -1570,7 +1571,7 @@
           <a:p>
             <a:fld id="{CB066C04-F0DD-4D0D-8700-364E6D806A2A}" type="datetimeFigureOut">
               <a:rPr kumimoji="1" lang="ja-JP" altLang="en-US" smtClean="0"/>
-              <a:t>2025/5/11</a:t>
+              <a:t>2025/5/13</a:t>
             </a:fld>
             <a:endParaRPr kumimoji="1" lang="ja-JP" altLang="en-US"/>
           </a:p>
@@ -2046,7 +2047,7 @@
           <a:p>
             <a:fld id="{CB066C04-F0DD-4D0D-8700-364E6D806A2A}" type="datetimeFigureOut">
               <a:rPr kumimoji="1" lang="ja-JP" altLang="en-US" smtClean="0"/>
-              <a:t>2025/5/11</a:t>
+              <a:t>2025/5/13</a:t>
             </a:fld>
             <a:endParaRPr kumimoji="1" lang="ja-JP" altLang="en-US"/>
           </a:p>
@@ -2187,7 +2188,7 @@
           <a:p>
             <a:fld id="{CB066C04-F0DD-4D0D-8700-364E6D806A2A}" type="datetimeFigureOut">
               <a:rPr kumimoji="1" lang="ja-JP" altLang="en-US" smtClean="0"/>
-              <a:t>2025/5/11</a:t>
+              <a:t>2025/5/13</a:t>
             </a:fld>
             <a:endParaRPr kumimoji="1" lang="ja-JP" altLang="en-US"/>
           </a:p>
@@ -2300,7 +2301,7 @@
           <a:p>
             <a:fld id="{CB066C04-F0DD-4D0D-8700-364E6D806A2A}" type="datetimeFigureOut">
               <a:rPr kumimoji="1" lang="ja-JP" altLang="en-US" smtClean="0"/>
-              <a:t>2025/5/11</a:t>
+              <a:t>2025/5/13</a:t>
             </a:fld>
             <a:endParaRPr kumimoji="1" lang="ja-JP" altLang="en-US"/>
           </a:p>
@@ -2643,7 +2644,7 @@
           <a:p>
             <a:fld id="{CB066C04-F0DD-4D0D-8700-364E6D806A2A}" type="datetimeFigureOut">
               <a:rPr kumimoji="1" lang="ja-JP" altLang="en-US" smtClean="0"/>
-              <a:t>2025/5/11</a:t>
+              <a:t>2025/5/13</a:t>
             </a:fld>
             <a:endParaRPr kumimoji="1" lang="ja-JP" altLang="en-US"/>
           </a:p>
@@ -2931,7 +2932,7 @@
           <a:p>
             <a:fld id="{CB066C04-F0DD-4D0D-8700-364E6D806A2A}" type="datetimeFigureOut">
               <a:rPr kumimoji="1" lang="ja-JP" altLang="en-US" smtClean="0"/>
-              <a:t>2025/5/11</a:t>
+              <a:t>2025/5/13</a:t>
             </a:fld>
             <a:endParaRPr kumimoji="1" lang="ja-JP" altLang="en-US"/>
           </a:p>
@@ -3204,7 +3205,7 @@
           <a:p>
             <a:fld id="{CB066C04-F0DD-4D0D-8700-364E6D806A2A}" type="datetimeFigureOut">
               <a:rPr kumimoji="1" lang="ja-JP" altLang="en-US" smtClean="0"/>
-              <a:t>2025/5/11</a:t>
+              <a:t>2025/5/13</a:t>
             </a:fld>
             <a:endParaRPr kumimoji="1" lang="ja-JP" altLang="en-US"/>
           </a:p>
@@ -5047,11 +5048,211 @@
           </a:bodyPr>
           <a:lstStyle/>
           <a:p>
-            <a:endParaRPr kumimoji="1" lang="ja-JP" altLang="en-US" sz="2000" dirty="0">
-              <a:latin typeface="UD デジタル 教科書体 NK-B" panose="020B0400000000000000" pitchFamily="18" charset="-128"/>
-              <a:ea typeface="UD デジタル 教科書体 NK-B" panose="020B0400000000000000" pitchFamily="18" charset="-128"/>
-              <a:cs typeface="ADLaM Display" panose="020F0502020204030204" pitchFamily="2" charset="0"/>
-            </a:endParaRPr>
+            <a:r>
+              <a:rPr kumimoji="1" lang="ja-JP" altLang="en-US" sz="2000" dirty="0">
+                <a:latin typeface="UD デジタル 教科書体 NK-B" panose="020B0400000000000000" pitchFamily="18" charset="-128"/>
+                <a:ea typeface="UD デジタル 教科書体 NK-B" panose="020B0400000000000000" pitchFamily="18" charset="-128"/>
+                <a:cs typeface="ADLaM Display" panose="020F0502020204030204" pitchFamily="2" charset="0"/>
+              </a:rPr>
+              <a:t>検討すべき対応策</a:t>
+            </a:r>
+          </a:p>
+        </p:txBody>
+      </p:sp>
+      <p:sp>
+        <p:nvSpPr>
+          <p:cNvPr id="8" name="テキスト ボックス 7">
+            <a:extLst>
+              <a:ext uri="{FF2B5EF4-FFF2-40B4-BE49-F238E27FC236}">
+                <a16:creationId xmlns:a16="http://schemas.microsoft.com/office/drawing/2014/main" id="{5B8F55F5-65F2-83E6-6637-BF3889EDDAAE}"/>
+              </a:ext>
+            </a:extLst>
+          </p:cNvPr>
+          <p:cNvSpPr txBox="1"/>
+          <p:nvPr/>
+        </p:nvSpPr>
+        <p:spPr>
+          <a:xfrm>
+            <a:off x="124811" y="1582524"/>
+            <a:ext cx="5832927" cy="3593291"/>
+          </a:xfrm>
+          <a:prstGeom prst="rect">
+            <a:avLst/>
+          </a:prstGeom>
+          <a:noFill/>
+        </p:spPr>
+        <p:txBody>
+          <a:bodyPr wrap="square" rtlCol="0">
+            <a:spAutoFit/>
+          </a:bodyPr>
+          <a:lstStyle/>
+          <a:p>
+            <a:pPr>
+              <a:lnSpc>
+                <a:spcPct val="130000"/>
+              </a:lnSpc>
+            </a:pPr>
+            <a:r>
+              <a:rPr kumimoji="1" lang="ja-JP" altLang="en-US" sz="1400" b="1" dirty="0"/>
+              <a:t>理解する</a:t>
+            </a:r>
+            <a:endParaRPr kumimoji="1" lang="en-US" altLang="ja-JP" sz="1400" b="1" dirty="0"/>
+          </a:p>
+          <a:p>
+            <a:pPr marL="176213" indent="-176213">
+              <a:lnSpc>
+                <a:spcPct val="130000"/>
+              </a:lnSpc>
+            </a:pPr>
+            <a:r>
+              <a:rPr lang="ja-JP" altLang="en-US" sz="1200" dirty="0"/>
+              <a:t>・サイバーセキュリティリスクが、ビジネスのミッションの達成にどのような影響を与えるかを理解する（</a:t>
+            </a:r>
+            <a:r>
+              <a:rPr lang="en-US" altLang="ja-JP" sz="1200" dirty="0"/>
+              <a:t>GV.OC-01</a:t>
+            </a:r>
+            <a:r>
+              <a:rPr lang="ja-JP" altLang="en-US" sz="1200" dirty="0"/>
+              <a:t>）</a:t>
+            </a:r>
+            <a:endParaRPr lang="en-US" altLang="ja-JP" sz="1200" dirty="0"/>
+          </a:p>
+          <a:p>
+            <a:pPr marL="176213" indent="-176213">
+              <a:lnSpc>
+                <a:spcPct val="130000"/>
+              </a:lnSpc>
+            </a:pPr>
+            <a:r>
+              <a:rPr lang="ja-JP" altLang="en-US" sz="1200" dirty="0"/>
+              <a:t>・法的要求事項、規制上の要件及び契約上の要求事項を理解する（</a:t>
+            </a:r>
+            <a:r>
+              <a:rPr lang="en-US" altLang="ja-JP" sz="1200" dirty="0"/>
+              <a:t>GV.OC-03</a:t>
+            </a:r>
+            <a:r>
+              <a:rPr lang="ja-JP" altLang="en-US" sz="1200" dirty="0"/>
+              <a:t>）</a:t>
+            </a:r>
+            <a:endParaRPr lang="en-US" altLang="ja-JP" sz="1200" dirty="0"/>
+          </a:p>
+          <a:p>
+            <a:pPr marL="176213" indent="-176213">
+              <a:lnSpc>
+                <a:spcPct val="130000"/>
+              </a:lnSpc>
+            </a:pPr>
+            <a:r>
+              <a:rPr lang="ja-JP" altLang="en-US" sz="1200" dirty="0"/>
+              <a:t>・組織内の誰がサイバーセキュリティ戦略の策定及び実行に責任を持つか理解する（</a:t>
+            </a:r>
+            <a:r>
+              <a:rPr lang="en-US" altLang="ja-JP" sz="1200" dirty="0"/>
+              <a:t>GV.RR-02</a:t>
+            </a:r>
+            <a:r>
+              <a:rPr lang="ja-JP" altLang="en-US" sz="1200" dirty="0"/>
+              <a:t>）</a:t>
+            </a:r>
+            <a:endParaRPr lang="en-US" altLang="ja-JP" sz="1200" dirty="0"/>
+          </a:p>
+          <a:p>
+            <a:pPr>
+              <a:lnSpc>
+                <a:spcPct val="130000"/>
+              </a:lnSpc>
+            </a:pPr>
+            <a:r>
+              <a:rPr lang="ja-JP" altLang="en-US" sz="1400" b="1" dirty="0"/>
+              <a:t>評価する</a:t>
+            </a:r>
+            <a:endParaRPr lang="en-US" altLang="ja-JP" sz="1400" b="1" dirty="0"/>
+          </a:p>
+          <a:p>
+            <a:pPr marL="176213" indent="-176213">
+              <a:lnSpc>
+                <a:spcPct val="130000"/>
+              </a:lnSpc>
+            </a:pPr>
+            <a:r>
+              <a:rPr lang="ja-JP" altLang="en-US" sz="1200" dirty="0"/>
+              <a:t>・重要な事業資産および業務の全部または一部の損失による潜在的な影響を評価する（</a:t>
+            </a:r>
+            <a:r>
+              <a:rPr lang="en-US" altLang="ja-JP" sz="1200" dirty="0"/>
+              <a:t>GV.OC-04</a:t>
+            </a:r>
+            <a:r>
+              <a:rPr lang="ja-JP" altLang="en-US" sz="1200" dirty="0"/>
+              <a:t>）</a:t>
+            </a:r>
+            <a:endParaRPr lang="en-US" altLang="ja-JP" sz="1200" dirty="0"/>
+          </a:p>
+          <a:p>
+            <a:pPr marL="176213" indent="-176213">
+              <a:lnSpc>
+                <a:spcPct val="130000"/>
+              </a:lnSpc>
+            </a:pPr>
+            <a:r>
+              <a:rPr lang="ja-JP" altLang="en-US" sz="1200" dirty="0"/>
+              <a:t>・サイバーセキュリティ保証が事業にとって適切か評価する（</a:t>
+            </a:r>
+            <a:r>
+              <a:rPr lang="en-US" altLang="ja-JP" sz="1200" dirty="0"/>
+              <a:t>GV.RM-04</a:t>
+            </a:r>
+            <a:r>
+              <a:rPr lang="ja-JP" altLang="en-US" sz="1200" dirty="0"/>
+              <a:t>）</a:t>
+            </a:r>
+            <a:endParaRPr lang="en-US" altLang="ja-JP" sz="1200" dirty="0"/>
+          </a:p>
+          <a:p>
+            <a:pPr marL="176213" indent="-176213">
+              <a:lnSpc>
+                <a:spcPct val="130000"/>
+              </a:lnSpc>
+            </a:pPr>
+            <a:r>
+              <a:rPr lang="ja-JP" altLang="en-US" sz="1200" dirty="0"/>
+              <a:t>・サプライヤーやその他の第三者と正式な関係を構築する前に、それらがもたらすサイバーセキュリティリスクを評価する（</a:t>
+            </a:r>
+            <a:r>
+              <a:rPr lang="en-US" altLang="ja-JP" sz="1200" dirty="0"/>
+              <a:t>GV.SC-06</a:t>
+            </a:r>
+            <a:r>
+              <a:rPr lang="ja-JP" altLang="en-US" sz="1200" dirty="0"/>
+              <a:t>）</a:t>
+            </a:r>
+            <a:endParaRPr lang="en-US" altLang="ja-JP" sz="1200" dirty="0"/>
+          </a:p>
+          <a:p>
+            <a:pPr>
+              <a:lnSpc>
+                <a:spcPct val="130000"/>
+              </a:lnSpc>
+            </a:pPr>
+            <a:r>
+              <a:rPr kumimoji="1" lang="ja-JP" altLang="en-US" sz="1400" b="1" dirty="0"/>
+              <a:t>優先順位付け</a:t>
+            </a:r>
+            <a:endParaRPr kumimoji="1" lang="en-US" altLang="ja-JP" sz="1400" b="1" dirty="0"/>
+          </a:p>
+          <a:p>
+            <a:pPr>
+              <a:lnSpc>
+                <a:spcPct val="130000"/>
+              </a:lnSpc>
+            </a:pPr>
+            <a:r>
+              <a:rPr lang="ja-JP" altLang="en-US" sz="1400" b="1" dirty="0"/>
+              <a:t>周知する</a:t>
+            </a:r>
+            <a:endParaRPr kumimoji="1" lang="en-US" altLang="ja-JP" sz="1400" b="1" dirty="0"/>
           </a:p>
         </p:txBody>
       </p:sp>
@@ -5245,21 +5446,15 @@
               <a:t>（</a:t>
             </a:r>
             <a:r>
-              <a:rPr kumimoji="1" lang="en-US" altLang="ja-JP" sz="2400" b="0" i="0" u="none" strike="noStrike" kern="1200" cap="none" spc="0" normalizeH="0" baseline="0" noProof="0" dirty="0">
-                <a:ln>
-                  <a:noFill/>
-                </a:ln>
+              <a:rPr lang="en-US" altLang="ja-JP" sz="2400" dirty="0">
                 <a:solidFill>
                   <a:prstClr val="black"/>
                 </a:solidFill>
-                <a:effectLst/>
-                <a:uLnTx/>
-                <a:uFillTx/>
                 <a:latin typeface="UD デジタル 教科書体 NK-B" panose="020B0400000000000000" pitchFamily="18" charset="-128"/>
                 <a:ea typeface="UD デジタル 教科書体 NK-B" panose="020B0400000000000000" pitchFamily="18" charset="-128"/>
                 <a:cs typeface="ADLaM Display" panose="020F0502020204030204" pitchFamily="2" charset="0"/>
               </a:rPr>
-              <a:t>GOVERN</a:t>
+              <a:t>IDENTIFY</a:t>
             </a:r>
             <a:r>
               <a:rPr kumimoji="1" lang="ja-JP" altLang="en-US" sz="2400" b="0" i="0" u="none" strike="noStrike" kern="1200" cap="none" spc="0" normalizeH="0" baseline="0" noProof="0" dirty="0">
@@ -5623,24 +5818,18 @@
                 <a:ea typeface="UD デジタル 教科書体 NK-B" panose="020B0400000000000000" pitchFamily="18" charset="-128"/>
                 <a:cs typeface="ADLaM Display" panose="020F0502020204030204" pitchFamily="2" charset="0"/>
               </a:rPr>
-              <a:t>統治（</a:t>
-            </a:r>
-            <a:r>
-              <a:rPr kumimoji="1" lang="en-US" altLang="ja-JP" sz="2400" b="0" i="0" u="none" strike="noStrike" kern="1200" cap="none" spc="0" normalizeH="0" baseline="0" noProof="0" dirty="0">
-                <a:ln>
-                  <a:noFill/>
-                </a:ln>
+              <a:t>防御（</a:t>
+            </a:r>
+            <a:r>
+              <a:rPr lang="en-US" altLang="ja-JP" sz="2400" dirty="0">
                 <a:solidFill>
                   <a:prstClr val="black"/>
                 </a:solidFill>
-                <a:effectLst/>
-                <a:uLnTx/>
-                <a:uFillTx/>
                 <a:latin typeface="UD デジタル 教科書体 NK-B" panose="020B0400000000000000" pitchFamily="18" charset="-128"/>
                 <a:ea typeface="UD デジタル 教科書体 NK-B" panose="020B0400000000000000" pitchFamily="18" charset="-128"/>
                 <a:cs typeface="ADLaM Display" panose="020F0502020204030204" pitchFamily="2" charset="0"/>
               </a:rPr>
-              <a:t>GOVERN</a:t>
+              <a:t>PROTECT</a:t>
             </a:r>
             <a:r>
               <a:rPr kumimoji="1" lang="ja-JP" altLang="en-US" sz="2400" b="0" i="0" u="none" strike="noStrike" kern="1200" cap="none" spc="0" normalizeH="0" baseline="0" noProof="0" dirty="0">
@@ -5683,7 +5872,7 @@
             <a:avLst/>
           </a:prstGeom>
           <a:solidFill>
-            <a:srgbClr val="FAF6A8"/>
+            <a:srgbClr val="BEBBF3"/>
           </a:solidFill>
         </p:spPr>
         <p:txBody>
@@ -5724,7 +5913,35 @@
                 <a:ea typeface="UD デジタル 教科書体 NK-B" panose="020B0400000000000000" pitchFamily="18" charset="-128"/>
                 <a:cs typeface="ADLaM Display" panose="020F0502020204030204" pitchFamily="2" charset="0"/>
               </a:rPr>
-              <a:t>「統治」機能 ： 組織のサイバーセキュリティマネジメント戦略、期待値及びポリシーを確立、監視を支援</a:t>
+              <a:t>「</a:t>
+            </a:r>
+            <a:r>
+              <a:rPr lang="ja-JP" altLang="en-US" sz="2000" dirty="0">
+                <a:solidFill>
+                  <a:prstClr val="black"/>
+                </a:solidFill>
+                <a:latin typeface="UD デジタル 教科書体 NK-B" panose="020B0400000000000000" pitchFamily="18" charset="-128"/>
+                <a:ea typeface="UD デジタル 教科書体 NK-B" panose="020B0400000000000000" pitchFamily="18" charset="-128"/>
+                <a:cs typeface="ADLaM Display" panose="020F0502020204030204" pitchFamily="2" charset="0"/>
+              </a:rPr>
+              <a:t>防御</a:t>
+            </a:r>
+            <a:r>
+              <a:rPr kumimoji="1" lang="ja-JP" altLang="en-US" sz="2000" b="0" i="0" u="none" strike="noStrike" kern="1200" cap="none" spc="0" normalizeH="0" baseline="0" noProof="0" dirty="0">
+                <a:ln>
+                  <a:noFill/>
+                </a:ln>
+                <a:solidFill>
+                  <a:prstClr val="black"/>
+                </a:solidFill>
+                <a:effectLst/>
+                <a:uLnTx/>
+                <a:uFillTx/>
+                <a:latin typeface="UD デジタル 教科書体 NK-B" panose="020B0400000000000000" pitchFamily="18" charset="-128"/>
+                <a:ea typeface="UD デジタル 教科書体 NK-B" panose="020B0400000000000000" pitchFamily="18" charset="-128"/>
+                <a:cs typeface="ADLaM Display" panose="020F0502020204030204" pitchFamily="2" charset="0"/>
+              </a:rPr>
+              <a:t>」機能 ： 組織のサイバーセキュリティマネジメント戦略、期待値及びポリシーを確立、監視を支援</a:t>
             </a:r>
           </a:p>
         </p:txBody>
@@ -5785,7 +6002,7 @@
             <a:avLst/>
           </a:prstGeom>
           <a:solidFill>
-            <a:srgbClr val="FAF6A8"/>
+            <a:srgbClr val="BEBBF3"/>
           </a:solidFill>
         </p:spPr>
         <p:txBody>
@@ -6004,24 +6221,18 @@
                 <a:ea typeface="UD デジタル 教科書体 NK-B" panose="020B0400000000000000" pitchFamily="18" charset="-128"/>
                 <a:cs typeface="ADLaM Display" panose="020F0502020204030204" pitchFamily="2" charset="0"/>
               </a:rPr>
-              <a:t>統治（</a:t>
-            </a:r>
-            <a:r>
-              <a:rPr kumimoji="1" lang="en-US" altLang="ja-JP" sz="2400" b="0" i="0" u="none" strike="noStrike" kern="1200" cap="none" spc="0" normalizeH="0" baseline="0" noProof="0" dirty="0">
-                <a:ln>
-                  <a:noFill/>
-                </a:ln>
+              <a:t>検知（</a:t>
+            </a:r>
+            <a:r>
+              <a:rPr lang="en-US" altLang="ja-JP" sz="2400" dirty="0">
                 <a:solidFill>
                   <a:prstClr val="black"/>
                 </a:solidFill>
-                <a:effectLst/>
-                <a:uLnTx/>
-                <a:uFillTx/>
                 <a:latin typeface="UD デジタル 教科書体 NK-B" panose="020B0400000000000000" pitchFamily="18" charset="-128"/>
                 <a:ea typeface="UD デジタル 教科書体 NK-B" panose="020B0400000000000000" pitchFamily="18" charset="-128"/>
                 <a:cs typeface="ADLaM Display" panose="020F0502020204030204" pitchFamily="2" charset="0"/>
               </a:rPr>
-              <a:t>GOVERN</a:t>
+              <a:t>DETECT</a:t>
             </a:r>
             <a:r>
               <a:rPr kumimoji="1" lang="ja-JP" altLang="en-US" sz="2400" b="0" i="0" u="none" strike="noStrike" kern="1200" cap="none" spc="0" normalizeH="0" baseline="0" noProof="0" dirty="0">
@@ -6064,7 +6275,7 @@
             <a:avLst/>
           </a:prstGeom>
           <a:solidFill>
-            <a:srgbClr val="FAF6A8"/>
+            <a:srgbClr val="FCD18C"/>
           </a:solidFill>
         </p:spPr>
         <p:txBody>
@@ -6105,7 +6316,35 @@
                 <a:ea typeface="UD デジタル 教科書体 NK-B" panose="020B0400000000000000" pitchFamily="18" charset="-128"/>
                 <a:cs typeface="ADLaM Display" panose="020F0502020204030204" pitchFamily="2" charset="0"/>
               </a:rPr>
-              <a:t>「統治」機能 ： 組織のサイバーセキュリティマネジメント戦略、期待値及びポリシーを確立、監視を支援</a:t>
+              <a:t>「</a:t>
+            </a:r>
+            <a:r>
+              <a:rPr lang="ja-JP" altLang="en-US" sz="2000" dirty="0">
+                <a:solidFill>
+                  <a:prstClr val="black"/>
+                </a:solidFill>
+                <a:latin typeface="UD デジタル 教科書体 NK-B" panose="020B0400000000000000" pitchFamily="18" charset="-128"/>
+                <a:ea typeface="UD デジタル 教科書体 NK-B" panose="020B0400000000000000" pitchFamily="18" charset="-128"/>
+                <a:cs typeface="ADLaM Display" panose="020F0502020204030204" pitchFamily="2" charset="0"/>
+              </a:rPr>
+              <a:t>検知</a:t>
+            </a:r>
+            <a:r>
+              <a:rPr kumimoji="1" lang="ja-JP" altLang="en-US" sz="2000" b="0" i="0" u="none" strike="noStrike" kern="1200" cap="none" spc="0" normalizeH="0" baseline="0" noProof="0" dirty="0">
+                <a:ln>
+                  <a:noFill/>
+                </a:ln>
+                <a:solidFill>
+                  <a:prstClr val="black"/>
+                </a:solidFill>
+                <a:effectLst/>
+                <a:uLnTx/>
+                <a:uFillTx/>
+                <a:latin typeface="UD デジタル 教科書体 NK-B" panose="020B0400000000000000" pitchFamily="18" charset="-128"/>
+                <a:ea typeface="UD デジタル 教科書体 NK-B" panose="020B0400000000000000" pitchFamily="18" charset="-128"/>
+                <a:cs typeface="ADLaM Display" panose="020F0502020204030204" pitchFamily="2" charset="0"/>
+              </a:rPr>
+              <a:t>」機能 ： 組織のサイバーセキュリティマネジメント戦略、期待値及びポリシーを確立、監視を支援</a:t>
             </a:r>
           </a:p>
         </p:txBody>
@@ -6166,7 +6405,7 @@
             <a:avLst/>
           </a:prstGeom>
           <a:solidFill>
-            <a:srgbClr val="FAF6A8"/>
+            <a:srgbClr val="FCD18C"/>
           </a:solidFill>
         </p:spPr>
         <p:txBody>
@@ -6371,6 +6610,17 @@
               <a:defRPr/>
             </a:pPr>
             <a:r>
+              <a:rPr lang="ja-JP" altLang="en-US" sz="2400" dirty="0">
+                <a:solidFill>
+                  <a:prstClr val="black"/>
+                </a:solidFill>
+                <a:latin typeface="UD デジタル 教科書体 NK-B" panose="020B0400000000000000" pitchFamily="18" charset="-128"/>
+                <a:ea typeface="UD デジタル 教科書体 NK-B" panose="020B0400000000000000" pitchFamily="18" charset="-128"/>
+                <a:cs typeface="ADLaM Display" panose="020F0502020204030204" pitchFamily="2" charset="0"/>
+              </a:rPr>
+              <a:t>対応</a:t>
+            </a:r>
+            <a:r>
               <a:rPr kumimoji="1" lang="ja-JP" altLang="en-US" sz="2400" b="0" i="0" u="none" strike="noStrike" kern="1200" cap="none" spc="0" normalizeH="0" baseline="0" noProof="0" dirty="0">
                 <a:ln>
                   <a:noFill/>
@@ -6385,24 +6635,18 @@
                 <a:ea typeface="UD デジタル 教科書体 NK-B" panose="020B0400000000000000" pitchFamily="18" charset="-128"/>
                 <a:cs typeface="ADLaM Display" panose="020F0502020204030204" pitchFamily="2" charset="0"/>
               </a:rPr>
-              <a:t>統治（</a:t>
-            </a:r>
-            <a:r>
-              <a:rPr kumimoji="1" lang="en-US" altLang="ja-JP" sz="2400" b="0" i="0" u="none" strike="noStrike" kern="1200" cap="none" spc="0" normalizeH="0" baseline="0" noProof="0" dirty="0">
-                <a:ln>
-                  <a:noFill/>
-                </a:ln>
+              <a:t>（</a:t>
+            </a:r>
+            <a:r>
+              <a:rPr lang="en-US" altLang="ja-JP" sz="2400" dirty="0">
                 <a:solidFill>
                   <a:prstClr val="black"/>
                 </a:solidFill>
-                <a:effectLst/>
-                <a:uLnTx/>
-                <a:uFillTx/>
                 <a:latin typeface="UD デジタル 教科書体 NK-B" panose="020B0400000000000000" pitchFamily="18" charset="-128"/>
                 <a:ea typeface="UD デジタル 教科書体 NK-B" panose="020B0400000000000000" pitchFamily="18" charset="-128"/>
                 <a:cs typeface="ADLaM Display" panose="020F0502020204030204" pitchFamily="2" charset="0"/>
               </a:rPr>
-              <a:t>GOVERN</a:t>
+              <a:t>RESPOND</a:t>
             </a:r>
             <a:r>
               <a:rPr kumimoji="1" lang="ja-JP" altLang="en-US" sz="2400" b="0" i="0" u="none" strike="noStrike" kern="1200" cap="none" spc="0" normalizeH="0" baseline="0" noProof="0" dirty="0">
@@ -6445,7 +6689,7 @@
             <a:avLst/>
           </a:prstGeom>
           <a:solidFill>
-            <a:srgbClr val="FAF6A8"/>
+            <a:srgbClr val="EFABAB"/>
           </a:solidFill>
         </p:spPr>
         <p:txBody>
@@ -6486,7 +6730,35 @@
                 <a:ea typeface="UD デジタル 教科書体 NK-B" panose="020B0400000000000000" pitchFamily="18" charset="-128"/>
                 <a:cs typeface="ADLaM Display" panose="020F0502020204030204" pitchFamily="2" charset="0"/>
               </a:rPr>
-              <a:t>「統治」機能 ： 組織のサイバーセキュリティマネジメント戦略、期待値及びポリシーを確立、監視を支援</a:t>
+              <a:t>「</a:t>
+            </a:r>
+            <a:r>
+              <a:rPr lang="ja-JP" altLang="en-US" sz="2000" dirty="0">
+                <a:solidFill>
+                  <a:prstClr val="black"/>
+                </a:solidFill>
+                <a:latin typeface="UD デジタル 教科書体 NK-B" panose="020B0400000000000000" pitchFamily="18" charset="-128"/>
+                <a:ea typeface="UD デジタル 教科書体 NK-B" panose="020B0400000000000000" pitchFamily="18" charset="-128"/>
+                <a:cs typeface="ADLaM Display" panose="020F0502020204030204" pitchFamily="2" charset="0"/>
+              </a:rPr>
+              <a:t>対応</a:t>
+            </a:r>
+            <a:r>
+              <a:rPr kumimoji="1" lang="ja-JP" altLang="en-US" sz="2000" b="0" i="0" u="none" strike="noStrike" kern="1200" cap="none" spc="0" normalizeH="0" baseline="0" noProof="0" dirty="0">
+                <a:ln>
+                  <a:noFill/>
+                </a:ln>
+                <a:solidFill>
+                  <a:prstClr val="black"/>
+                </a:solidFill>
+                <a:effectLst/>
+                <a:uLnTx/>
+                <a:uFillTx/>
+                <a:latin typeface="UD デジタル 教科書体 NK-B" panose="020B0400000000000000" pitchFamily="18" charset="-128"/>
+                <a:ea typeface="UD デジタル 教科書体 NK-B" panose="020B0400000000000000" pitchFamily="18" charset="-128"/>
+                <a:cs typeface="ADLaM Display" panose="020F0502020204030204" pitchFamily="2" charset="0"/>
+              </a:rPr>
+              <a:t>」機能 ： 組織のサイバーセキュリティマネジメント戦略、期待値及びポリシーを確立、監視を支援</a:t>
             </a:r>
           </a:p>
         </p:txBody>
@@ -6547,7 +6819,7 @@
             <a:avLst/>
           </a:prstGeom>
           <a:solidFill>
-            <a:srgbClr val="FAF6A8"/>
+            <a:srgbClr val="EFABAB"/>
           </a:solidFill>
         </p:spPr>
         <p:txBody>
@@ -6594,6 +6866,420 @@
     <p:extLst>
       <p:ext uri="{BB962C8B-B14F-4D97-AF65-F5344CB8AC3E}">
         <p14:creationId xmlns:p14="http://schemas.microsoft.com/office/powerpoint/2010/main" val="408609350"/>
+      </p:ext>
+    </p:extLst>
+  </p:cSld>
+  <p:clrMapOvr>
+    <a:masterClrMapping/>
+  </p:clrMapOvr>
+</p:sld>
+</file>
+
+<file path=ppt/slides/slide9.xml><?xml version="1.0" encoding="utf-8"?>
+<p:sld xmlns:a="http://schemas.openxmlformats.org/drawingml/2006/main" xmlns:r="http://schemas.openxmlformats.org/officeDocument/2006/relationships" xmlns:p="http://schemas.openxmlformats.org/presentationml/2006/main">
+  <p:cSld>
+    <p:bg>
+      <p:bgPr>
+        <a:solidFill>
+          <a:srgbClr val="CFD8EB"/>
+        </a:solidFill>
+        <a:effectLst/>
+      </p:bgPr>
+    </p:bg>
+    <p:spTree>
+      <p:nvGrpSpPr>
+        <p:cNvPr id="1" name="">
+          <a:extLst>
+            <a:ext uri="{FF2B5EF4-FFF2-40B4-BE49-F238E27FC236}">
+              <a16:creationId xmlns:a16="http://schemas.microsoft.com/office/drawing/2014/main" id="{17241968-42ED-3F72-244B-EDFECA71327B}"/>
+            </a:ext>
+          </a:extLst>
+        </p:cNvPr>
+        <p:cNvGrpSpPr/>
+        <p:nvPr/>
+      </p:nvGrpSpPr>
+      <p:grpSpPr>
+        <a:xfrm>
+          <a:off x="0" y="0"/>
+          <a:ext cx="0" cy="0"/>
+          <a:chOff x="0" y="0"/>
+          <a:chExt cx="0" cy="0"/>
+        </a:xfrm>
+      </p:grpSpPr>
+      <p:pic>
+        <p:nvPicPr>
+          <p:cNvPr id="7" name="図 6">
+            <a:extLst>
+              <a:ext uri="{FF2B5EF4-FFF2-40B4-BE49-F238E27FC236}">
+                <a16:creationId xmlns:a16="http://schemas.microsoft.com/office/drawing/2014/main" id="{7E1BF8CC-6B81-4A84-6BCB-EE30CA41AE56}"/>
+              </a:ext>
+            </a:extLst>
+          </p:cNvPr>
+          <p:cNvPicPr>
+            <a:picLocks/>
+          </p:cNvPicPr>
+          <p:nvPr/>
+        </p:nvPicPr>
+        <p:blipFill>
+          <a:blip r:embed="rId2">
+            <a:extLst>
+              <a:ext uri="{28A0092B-C50C-407E-A947-70E740481C1C}">
+                <a14:useLocalDpi xmlns:a14="http://schemas.microsoft.com/office/drawing/2010/main" val="0"/>
+              </a:ext>
+            </a:extLst>
+          </a:blip>
+          <a:stretch>
+            <a:fillRect/>
+          </a:stretch>
+        </p:blipFill>
+        <p:spPr>
+          <a:xfrm>
+            <a:off x="6234260" y="1182414"/>
+            <a:ext cx="5851401" cy="5393875"/>
+          </a:xfrm>
+          <a:prstGeom prst="rect">
+            <a:avLst/>
+          </a:prstGeom>
+        </p:spPr>
+      </p:pic>
+      <p:pic>
+        <p:nvPicPr>
+          <p:cNvPr id="9" name="図 8">
+            <a:extLst>
+              <a:ext uri="{FF2B5EF4-FFF2-40B4-BE49-F238E27FC236}">
+                <a16:creationId xmlns:a16="http://schemas.microsoft.com/office/drawing/2014/main" id="{D25CE526-A5F5-A127-344E-C40A0B27C9D7}"/>
+              </a:ext>
+            </a:extLst>
+          </p:cNvPr>
+          <p:cNvPicPr>
+            <a:picLocks/>
+          </p:cNvPicPr>
+          <p:nvPr/>
+        </p:nvPicPr>
+        <p:blipFill>
+          <a:blip r:embed="rId3">
+            <a:extLst>
+              <a:ext uri="{28A0092B-C50C-407E-A947-70E740481C1C}">
+                <a14:useLocalDpi xmlns:a14="http://schemas.microsoft.com/office/drawing/2010/main" val="0"/>
+              </a:ext>
+            </a:extLst>
+          </a:blip>
+          <a:stretch>
+            <a:fillRect/>
+          </a:stretch>
+        </p:blipFill>
+        <p:spPr>
+          <a:xfrm>
+            <a:off x="106338" y="1182415"/>
+            <a:ext cx="5851401" cy="5393876"/>
+          </a:xfrm>
+          <a:prstGeom prst="rect">
+            <a:avLst/>
+          </a:prstGeom>
+        </p:spPr>
+      </p:pic>
+      <p:sp>
+        <p:nvSpPr>
+          <p:cNvPr id="3" name="テキスト ボックス 2">
+            <a:extLst>
+              <a:ext uri="{FF2B5EF4-FFF2-40B4-BE49-F238E27FC236}">
+                <a16:creationId xmlns:a16="http://schemas.microsoft.com/office/drawing/2014/main" id="{E15C7F88-4CC4-CC52-8C17-95ED98ED89CB}"/>
+              </a:ext>
+            </a:extLst>
+          </p:cNvPr>
+          <p:cNvSpPr txBox="1"/>
+          <p:nvPr/>
+        </p:nvSpPr>
+        <p:spPr>
+          <a:xfrm>
+            <a:off x="2743200" y="125713"/>
+            <a:ext cx="6705598" cy="461665"/>
+          </a:xfrm>
+          <a:prstGeom prst="rect">
+            <a:avLst/>
+          </a:prstGeom>
+          <a:noFill/>
+        </p:spPr>
+        <p:txBody>
+          <a:bodyPr wrap="square" rtlCol="0">
+            <a:spAutoFit/>
+          </a:bodyPr>
+          <a:lstStyle/>
+          <a:p>
+            <a:pPr marL="0" marR="0" lvl="0" indent="0" algn="ctr" defTabSz="914400" rtl="0" eaLnBrk="1" fontAlgn="auto" latinLnBrk="0" hangingPunct="1">
+              <a:lnSpc>
+                <a:spcPct val="100000"/>
+              </a:lnSpc>
+              <a:spcBef>
+                <a:spcPts val="0"/>
+              </a:spcBef>
+              <a:spcAft>
+                <a:spcPts val="0"/>
+              </a:spcAft>
+              <a:buClrTx/>
+              <a:buSzTx/>
+              <a:buFontTx/>
+              <a:buNone/>
+              <a:tabLst/>
+              <a:defRPr/>
+            </a:pPr>
+            <a:r>
+              <a:rPr lang="ja-JP" altLang="en-US" sz="2400" dirty="0">
+                <a:solidFill>
+                  <a:prstClr val="black"/>
+                </a:solidFill>
+                <a:latin typeface="UD デジタル 教科書体 NK-B" panose="020B0400000000000000" pitchFamily="18" charset="-128"/>
+                <a:ea typeface="UD デジタル 教科書体 NK-B" panose="020B0400000000000000" pitchFamily="18" charset="-128"/>
+                <a:cs typeface="ADLaM Display" panose="020F0502020204030204" pitchFamily="2" charset="0"/>
+              </a:rPr>
+              <a:t>復旧</a:t>
+            </a:r>
+            <a:r>
+              <a:rPr kumimoji="1" lang="ja-JP" altLang="en-US" sz="2400" b="0" i="0" u="none" strike="noStrike" kern="1200" cap="none" spc="0" normalizeH="0" baseline="0" noProof="0" dirty="0">
+                <a:ln>
+                  <a:noFill/>
+                </a:ln>
+                <a:solidFill>
+                  <a:prstClr val="black"/>
+                </a:solidFill>
+                <a:effectLst/>
+                <a:uLnTx/>
+                <a:uFillTx/>
+                <a:latin typeface="UD デジタル 教科書体 NK-B" panose="020B0400000000000000" pitchFamily="18" charset="-128"/>
+                <a:ea typeface="UD デジタル 教科書体 NK-B" panose="020B0400000000000000" pitchFamily="18" charset="-128"/>
+                <a:cs typeface="ADLaM Display" panose="020F0502020204030204" pitchFamily="2" charset="0"/>
+              </a:rPr>
+              <a:t>（</a:t>
+            </a:r>
+            <a:r>
+              <a:rPr lang="en-US" altLang="ja-JP" sz="2400" dirty="0">
+                <a:solidFill>
+                  <a:prstClr val="black"/>
+                </a:solidFill>
+                <a:latin typeface="UD デジタル 教科書体 NK-B" panose="020B0400000000000000" pitchFamily="18" charset="-128"/>
+                <a:ea typeface="UD デジタル 教科書体 NK-B" panose="020B0400000000000000" pitchFamily="18" charset="-128"/>
+                <a:cs typeface="ADLaM Display" panose="020F0502020204030204" pitchFamily="2" charset="0"/>
+              </a:rPr>
+              <a:t>RECOVER</a:t>
+            </a:r>
+            <a:r>
+              <a:rPr kumimoji="1" lang="ja-JP" altLang="en-US" sz="2400" b="0" i="0" u="none" strike="noStrike" kern="1200" cap="none" spc="0" normalizeH="0" baseline="0" noProof="0" dirty="0">
+                <a:ln>
+                  <a:noFill/>
+                </a:ln>
+                <a:solidFill>
+                  <a:prstClr val="black"/>
+                </a:solidFill>
+                <a:effectLst/>
+                <a:uLnTx/>
+                <a:uFillTx/>
+                <a:latin typeface="UD デジタル 教科書体 NK-B" panose="020B0400000000000000" pitchFamily="18" charset="-128"/>
+                <a:ea typeface="UD デジタル 教科書体 NK-B" panose="020B0400000000000000" pitchFamily="18" charset="-128"/>
+                <a:cs typeface="ADLaM Display" panose="020F0502020204030204" pitchFamily="2" charset="0"/>
+              </a:rPr>
+              <a:t>）</a:t>
+            </a:r>
+          </a:p>
+        </p:txBody>
+      </p:sp>
+      <p:sp>
+        <p:nvSpPr>
+          <p:cNvPr id="4" name="テキスト ボックス 3">
+            <a:extLst>
+              <a:ext uri="{FF2B5EF4-FFF2-40B4-BE49-F238E27FC236}">
+                <a16:creationId xmlns:a16="http://schemas.microsoft.com/office/drawing/2014/main" id="{CC897816-3647-1E2E-6BA0-180DF95D1E5E}"/>
+              </a:ext>
+            </a:extLst>
+          </p:cNvPr>
+          <p:cNvSpPr txBox="1"/>
+          <p:nvPr/>
+        </p:nvSpPr>
+        <p:spPr>
+          <a:xfrm>
+            <a:off x="106340" y="587378"/>
+            <a:ext cx="11979320" cy="400110"/>
+          </a:xfrm>
+          <a:prstGeom prst="rect">
+            <a:avLst/>
+          </a:prstGeom>
+          <a:solidFill>
+            <a:srgbClr val="B5F9C8"/>
+          </a:solidFill>
+        </p:spPr>
+        <p:txBody>
+          <a:bodyPr wrap="square" rtlCol="0" anchor="ctr">
+            <a:spAutoFit/>
+          </a:bodyPr>
+          <a:lstStyle/>
+          <a:p>
+            <a:pPr marL="0" marR="0" lvl="0" indent="0" algn="l" defTabSz="914400" rtl="0" eaLnBrk="1" fontAlgn="auto" latinLnBrk="0" hangingPunct="1">
+              <a:lnSpc>
+                <a:spcPct val="100000"/>
+              </a:lnSpc>
+              <a:spcBef>
+                <a:spcPts val="0"/>
+              </a:spcBef>
+              <a:spcAft>
+                <a:spcPts val="0"/>
+              </a:spcAft>
+              <a:buClrTx/>
+              <a:buSzTx/>
+              <a:buFontTx/>
+              <a:buNone/>
+              <a:tabLst/>
+              <a:defRPr/>
+            </a:pPr>
+            <a:r>
+              <a:rPr kumimoji="1" lang="ja-JP" altLang="en-US" sz="2000" b="0" i="0" u="none" strike="noStrike" kern="1200" cap="none" spc="0" normalizeH="0" baseline="0" noProof="0" dirty="0">
+                <a:ln>
+                  <a:noFill/>
+                </a:ln>
+                <a:solidFill>
+                  <a:prstClr val="black"/>
+                </a:solidFill>
+                <a:effectLst/>
+                <a:uLnTx/>
+                <a:uFillTx/>
+                <a:latin typeface="UD デジタル 教科書体 NK-B" panose="020B0400000000000000" pitchFamily="18" charset="-128"/>
+                <a:ea typeface="UD デジタル 教科書体 NK-B" panose="020B0400000000000000" pitchFamily="18" charset="-128"/>
+                <a:cs typeface="ADLaM Display" panose="020F0502020204030204" pitchFamily="2" charset="0"/>
+              </a:rPr>
+              <a:t>「</a:t>
+            </a:r>
+            <a:r>
+              <a:rPr lang="ja-JP" altLang="en-US" sz="2000" dirty="0">
+                <a:solidFill>
+                  <a:prstClr val="black"/>
+                </a:solidFill>
+                <a:latin typeface="UD デジタル 教科書体 NK-B" panose="020B0400000000000000" pitchFamily="18" charset="-128"/>
+                <a:ea typeface="UD デジタル 教科書体 NK-B" panose="020B0400000000000000" pitchFamily="18" charset="-128"/>
+                <a:cs typeface="ADLaM Display" panose="020F0502020204030204" pitchFamily="2" charset="0"/>
+              </a:rPr>
+              <a:t>復旧</a:t>
+            </a:r>
+            <a:r>
+              <a:rPr kumimoji="1" lang="ja-JP" altLang="en-US" sz="2000" b="0" i="0" u="none" strike="noStrike" kern="1200" cap="none" spc="0" normalizeH="0" baseline="0" noProof="0" dirty="0">
+                <a:ln>
+                  <a:noFill/>
+                </a:ln>
+                <a:solidFill>
+                  <a:prstClr val="black"/>
+                </a:solidFill>
+                <a:effectLst/>
+                <a:uLnTx/>
+                <a:uFillTx/>
+                <a:latin typeface="UD デジタル 教科書体 NK-B" panose="020B0400000000000000" pitchFamily="18" charset="-128"/>
+                <a:ea typeface="UD デジタル 教科書体 NK-B" panose="020B0400000000000000" pitchFamily="18" charset="-128"/>
+                <a:cs typeface="ADLaM Display" panose="020F0502020204030204" pitchFamily="2" charset="0"/>
+              </a:rPr>
+              <a:t>」機能 ： 組織のサイバーセキュリティマネジメント戦略、期待値及びポリシーを確立、監視を支援</a:t>
+            </a:r>
+          </a:p>
+        </p:txBody>
+      </p:sp>
+      <p:pic>
+        <p:nvPicPr>
+          <p:cNvPr id="2" name="図 1" descr="グラフ, サンバースト図&#10;&#10;AI によって生成されたコンテンツは間違っている可能性があります。">
+            <a:extLst>
+              <a:ext uri="{FF2B5EF4-FFF2-40B4-BE49-F238E27FC236}">
+                <a16:creationId xmlns:a16="http://schemas.microsoft.com/office/drawing/2014/main" id="{9F0EDC43-E1B5-47E8-CEF1-DA3782DB7F59}"/>
+              </a:ext>
+            </a:extLst>
+          </p:cNvPr>
+          <p:cNvPicPr>
+            <a:picLocks noChangeAspect="1"/>
+          </p:cNvPicPr>
+          <p:nvPr/>
+        </p:nvPicPr>
+        <p:blipFill>
+          <a:blip r:embed="rId4">
+            <a:extLst>
+              <a:ext uri="{28A0092B-C50C-407E-A947-70E740481C1C}">
+                <a14:useLocalDpi xmlns:a14="http://schemas.microsoft.com/office/drawing/2010/main" val="0"/>
+              </a:ext>
+            </a:extLst>
+          </a:blip>
+          <a:srcRect l="3766" t="-1003" r="4641"/>
+          <a:stretch/>
+        </p:blipFill>
+        <p:spPr>
+          <a:xfrm>
+            <a:off x="11143716" y="140359"/>
+            <a:ext cx="941944" cy="950439"/>
+          </a:xfrm>
+          <a:prstGeom prst="flowChartConnector">
+            <a:avLst/>
+          </a:prstGeom>
+        </p:spPr>
+      </p:pic>
+      <p:sp>
+        <p:nvSpPr>
+          <p:cNvPr id="5" name="テキスト ボックス 4">
+            <a:extLst>
+              <a:ext uri="{FF2B5EF4-FFF2-40B4-BE49-F238E27FC236}">
+                <a16:creationId xmlns:a16="http://schemas.microsoft.com/office/drawing/2014/main" id="{FAFCA8A3-A1BC-D5E6-4D2A-72AC281996BF}"/>
+              </a:ext>
+            </a:extLst>
+          </p:cNvPr>
+          <p:cNvSpPr txBox="1"/>
+          <p:nvPr/>
+        </p:nvSpPr>
+        <p:spPr>
+          <a:xfrm>
+            <a:off x="106338" y="1182414"/>
+            <a:ext cx="5851401" cy="400110"/>
+          </a:xfrm>
+          <a:prstGeom prst="rect">
+            <a:avLst/>
+          </a:prstGeom>
+          <a:solidFill>
+            <a:srgbClr val="B5F9C8"/>
+          </a:solidFill>
+        </p:spPr>
+        <p:txBody>
+          <a:bodyPr wrap="square" rtlCol="0" anchor="ctr">
+            <a:spAutoFit/>
+          </a:bodyPr>
+          <a:lstStyle/>
+          <a:p>
+            <a:pPr marL="0" marR="0" lvl="0" indent="0" algn="l" defTabSz="914400" rtl="0" eaLnBrk="1" fontAlgn="auto" latinLnBrk="0" hangingPunct="1">
+              <a:lnSpc>
+                <a:spcPct val="100000"/>
+              </a:lnSpc>
+              <a:spcBef>
+                <a:spcPts val="0"/>
+              </a:spcBef>
+              <a:spcAft>
+                <a:spcPts val="0"/>
+              </a:spcAft>
+              <a:buClrTx/>
+              <a:buSzTx/>
+              <a:buFontTx/>
+              <a:buNone/>
+              <a:tabLst/>
+              <a:defRPr/>
+            </a:pPr>
+            <a:endParaRPr kumimoji="1" lang="ja-JP" altLang="en-US" sz="2000" b="0" i="0" u="none" strike="noStrike" kern="1200" cap="none" spc="0" normalizeH="0" baseline="0" noProof="0" dirty="0">
+              <a:ln>
+                <a:noFill/>
+              </a:ln>
+              <a:solidFill>
+                <a:prstClr val="black"/>
+              </a:solidFill>
+              <a:effectLst/>
+              <a:uLnTx/>
+              <a:uFillTx/>
+              <a:latin typeface="UD デジタル 教科書体 NK-B" panose="020B0400000000000000" pitchFamily="18" charset="-128"/>
+              <a:ea typeface="UD デジタル 教科書体 NK-B" panose="020B0400000000000000" pitchFamily="18" charset="-128"/>
+              <a:cs typeface="ADLaM Display" panose="020F0502020204030204" pitchFamily="2" charset="0"/>
+            </a:endParaRPr>
+          </a:p>
+        </p:txBody>
+      </p:sp>
+    </p:spTree>
+    <p:extLst>
+      <p:ext uri="{BB962C8B-B14F-4D97-AF65-F5344CB8AC3E}">
+        <p14:creationId xmlns:p14="http://schemas.microsoft.com/office/powerpoint/2010/main" val="3773265415"/>
       </p:ext>
     </p:extLst>
   </p:cSld>

</xml_diff>